<commit_message>
Add Q&A #1 materials
</commit_message>
<xml_diff>
--- a/Other/QandA/QandA01_01.pptx
+++ b/Other/QandA/QandA01_01.pptx
@@ -114,6 +114,11 @@
       </a:defRPr>
     </a:lvl9pPr>
   </p:defaultTextStyle>
+  <p:extLst>
+    <p:ext uri="{EFAFB233-063F-42B5-8137-9DF3F51BA10A}">
+      <p15:sldGuideLst xmlns:p15="http://schemas.microsoft.com/office/powerpoint/2012/main"/>
+    </p:ext>
+  </p:extLst>
 </p:presentation>
 </file>
 
@@ -199,7 +204,7 @@
           <a:p>
             <a:fld id="{B3DEF748-D387-4123-93F5-493C93F93AE3}" type="datetimeFigureOut">
               <a:rPr lang="ru-RU" smtClean="0"/>
-              <a:t>07.10.2022</a:t>
+              <a:t>10.10.2022</a:t>
             </a:fld>
             <a:endParaRPr lang="ru-RU"/>
           </a:p>
@@ -1771,7 +1776,7 @@
           <a:p>
             <a:fld id="{FD561275-4B45-4947-B0F8-53DDD7EB5E8A}" type="datetimeFigureOut">
               <a:rPr lang="ru-RU" smtClean="0"/>
-              <a:t>07.10.2022</a:t>
+              <a:t>10.10.2022</a:t>
             </a:fld>
             <a:endParaRPr lang="ru-RU"/>
           </a:p>
@@ -1941,7 +1946,7 @@
           <a:p>
             <a:fld id="{FD561275-4B45-4947-B0F8-53DDD7EB5E8A}" type="datetimeFigureOut">
               <a:rPr lang="ru-RU" smtClean="0"/>
-              <a:t>07.10.2022</a:t>
+              <a:t>10.10.2022</a:t>
             </a:fld>
             <a:endParaRPr lang="ru-RU"/>
           </a:p>
@@ -2121,7 +2126,7 @@
           <a:p>
             <a:fld id="{FD561275-4B45-4947-B0F8-53DDD7EB5E8A}" type="datetimeFigureOut">
               <a:rPr lang="ru-RU" smtClean="0"/>
-              <a:t>07.10.2022</a:t>
+              <a:t>10.10.2022</a:t>
             </a:fld>
             <a:endParaRPr lang="ru-RU"/>
           </a:p>
@@ -2291,7 +2296,7 @@
           <a:p>
             <a:fld id="{FD561275-4B45-4947-B0F8-53DDD7EB5E8A}" type="datetimeFigureOut">
               <a:rPr lang="ru-RU" smtClean="0"/>
-              <a:t>07.10.2022</a:t>
+              <a:t>10.10.2022</a:t>
             </a:fld>
             <a:endParaRPr lang="ru-RU"/>
           </a:p>
@@ -2537,7 +2542,7 @@
           <a:p>
             <a:fld id="{FD561275-4B45-4947-B0F8-53DDD7EB5E8A}" type="datetimeFigureOut">
               <a:rPr lang="ru-RU" smtClean="0"/>
-              <a:t>07.10.2022</a:t>
+              <a:t>10.10.2022</a:t>
             </a:fld>
             <a:endParaRPr lang="ru-RU"/>
           </a:p>
@@ -2769,7 +2774,7 @@
           <a:p>
             <a:fld id="{FD561275-4B45-4947-B0F8-53DDD7EB5E8A}" type="datetimeFigureOut">
               <a:rPr lang="ru-RU" smtClean="0"/>
-              <a:t>07.10.2022</a:t>
+              <a:t>10.10.2022</a:t>
             </a:fld>
             <a:endParaRPr lang="ru-RU"/>
           </a:p>
@@ -3136,7 +3141,7 @@
           <a:p>
             <a:fld id="{FD561275-4B45-4947-B0F8-53DDD7EB5E8A}" type="datetimeFigureOut">
               <a:rPr lang="ru-RU" smtClean="0"/>
-              <a:t>07.10.2022</a:t>
+              <a:t>10.10.2022</a:t>
             </a:fld>
             <a:endParaRPr lang="ru-RU"/>
           </a:p>
@@ -3254,7 +3259,7 @@
           <a:p>
             <a:fld id="{FD561275-4B45-4947-B0F8-53DDD7EB5E8A}" type="datetimeFigureOut">
               <a:rPr lang="ru-RU" smtClean="0"/>
-              <a:t>07.10.2022</a:t>
+              <a:t>10.10.2022</a:t>
             </a:fld>
             <a:endParaRPr lang="ru-RU"/>
           </a:p>
@@ -3349,7 +3354,7 @@
           <a:p>
             <a:fld id="{FD561275-4B45-4947-B0F8-53DDD7EB5E8A}" type="datetimeFigureOut">
               <a:rPr lang="ru-RU" smtClean="0"/>
-              <a:t>07.10.2022</a:t>
+              <a:t>10.10.2022</a:t>
             </a:fld>
             <a:endParaRPr lang="ru-RU"/>
           </a:p>
@@ -3626,7 +3631,7 @@
           <a:p>
             <a:fld id="{FD561275-4B45-4947-B0F8-53DDD7EB5E8A}" type="datetimeFigureOut">
               <a:rPr lang="ru-RU" smtClean="0"/>
-              <a:t>07.10.2022</a:t>
+              <a:t>10.10.2022</a:t>
             </a:fld>
             <a:endParaRPr lang="ru-RU"/>
           </a:p>
@@ -3879,7 +3884,7 @@
           <a:p>
             <a:fld id="{FD561275-4B45-4947-B0F8-53DDD7EB5E8A}" type="datetimeFigureOut">
               <a:rPr lang="ru-RU" smtClean="0"/>
-              <a:t>07.10.2022</a:t>
+              <a:t>10.10.2022</a:t>
             </a:fld>
             <a:endParaRPr lang="ru-RU"/>
           </a:p>
@@ -4092,7 +4097,7 @@
           <a:p>
             <a:fld id="{FD561275-4B45-4947-B0F8-53DDD7EB5E8A}" type="datetimeFigureOut">
               <a:rPr lang="ru-RU" smtClean="0"/>
-              <a:t>07.10.2022</a:t>
+              <a:t>10.10.2022</a:t>
             </a:fld>
             <a:endParaRPr lang="ru-RU"/>
           </a:p>
@@ -4514,7 +4519,11 @@
           <a:p>
             <a:r>
               <a:rPr lang="en-US" dirty="0" smtClean="0"/>
-              <a:t>Q &amp; A</a:t>
+              <a:t>Q &amp; </a:t>
+            </a:r>
+            <a:r>
+              <a:rPr lang="en-US" dirty="0" smtClean="0"/>
+              <a:t>A – Unit tests</a:t>
             </a:r>
             <a:endParaRPr lang="ru-RU" dirty="0"/>
           </a:p>
@@ -7333,12 +7342,6 @@
               </a:rPr>
               <a:t>}</a:t>
             </a:r>
-            <a:endParaRPr lang="ru-RU" sz="1200" dirty="0" smtClean="0">
-              <a:solidFill>
-                <a:srgbClr val="000000"/>
-              </a:solidFill>
-              <a:latin typeface="Consolas" panose="020B0609020204030204" pitchFamily="49" charset="0"/>
-            </a:endParaRPr>
           </a:p>
         </p:txBody>
       </p:sp>

</xml_diff>